<commit_message>
Zalt Virtual Devices and start of GPU design,
</commit_message>
<xml_diff>
--- a/Design/Diagrams.pptx
+++ b/Design/Diagrams.pptx
@@ -7,6 +7,7 @@
   <p:sldIdLst>
     <p:sldId id="256" r:id="rId2"/>
     <p:sldId id="257" r:id="rId3"/>
+    <p:sldId id="258" r:id="rId4"/>
   </p:sldIdLst>
   <p:sldSz cx="12192000" cy="6858000"/>
   <p:notesSz cx="6858000" cy="9144000"/>
@@ -155,7 +156,7 @@
           </a:lstStyle>
           <a:p>
             <a:r>
-              <a:rPr lang="en-US" smtClean="0"/>
+              <a:rPr lang="en-US"/>
               <a:t>Click to edit Master title style</a:t>
             </a:r>
             <a:endParaRPr lang="nl-NL"/>
@@ -220,7 +221,7 @@
           </a:lstStyle>
           <a:p>
             <a:r>
-              <a:rPr lang="en-US" smtClean="0"/>
+              <a:rPr lang="en-US"/>
               <a:t>Click to edit Master subtitle style</a:t>
             </a:r>
             <a:endParaRPr lang="nl-NL"/>
@@ -244,7 +245,7 @@
           <a:p>
             <a:fld id="{1C607521-F3C3-4241-B9F9-5903AE8EACB6}" type="datetimeFigureOut">
               <a:rPr lang="nl-NL" smtClean="0"/>
-              <a:t>2-7-2016</a:t>
+              <a:t>25-1-2017</a:t>
             </a:fld>
             <a:endParaRPr lang="nl-NL"/>
           </a:p>
@@ -338,7 +339,7 @@
           <a:lstStyle/>
           <a:p>
             <a:r>
-              <a:rPr lang="en-US" smtClean="0"/>
+              <a:rPr lang="en-US"/>
               <a:t>Click to edit Master title style</a:t>
             </a:r>
             <a:endParaRPr lang="nl-NL"/>
@@ -362,35 +363,35 @@
           <a:p>
             <a:pPr lvl="0"/>
             <a:r>
-              <a:rPr lang="en-US" smtClean="0"/>
+              <a:rPr lang="en-US"/>
               <a:t>Click to edit Master text styles</a:t>
             </a:r>
           </a:p>
           <a:p>
             <a:pPr lvl="1"/>
             <a:r>
-              <a:rPr lang="en-US" smtClean="0"/>
+              <a:rPr lang="en-US"/>
               <a:t>Second level</a:t>
             </a:r>
           </a:p>
           <a:p>
             <a:pPr lvl="2"/>
             <a:r>
-              <a:rPr lang="en-US" smtClean="0"/>
+              <a:rPr lang="en-US"/>
               <a:t>Third level</a:t>
             </a:r>
           </a:p>
           <a:p>
             <a:pPr lvl="3"/>
             <a:r>
-              <a:rPr lang="en-US" smtClean="0"/>
+              <a:rPr lang="en-US"/>
               <a:t>Fourth level</a:t>
             </a:r>
           </a:p>
           <a:p>
             <a:pPr lvl="4"/>
             <a:r>
-              <a:rPr lang="en-US" smtClean="0"/>
+              <a:rPr lang="en-US"/>
               <a:t>Fifth level</a:t>
             </a:r>
             <a:endParaRPr lang="nl-NL"/>
@@ -414,7 +415,7 @@
           <a:p>
             <a:fld id="{1C607521-F3C3-4241-B9F9-5903AE8EACB6}" type="datetimeFigureOut">
               <a:rPr lang="nl-NL" smtClean="0"/>
-              <a:t>2-7-2016</a:t>
+              <a:t>25-1-2017</a:t>
             </a:fld>
             <a:endParaRPr lang="nl-NL"/>
           </a:p>
@@ -513,7 +514,7 @@
           <a:lstStyle/>
           <a:p>
             <a:r>
-              <a:rPr lang="en-US" smtClean="0"/>
+              <a:rPr lang="en-US"/>
               <a:t>Click to edit Master title style</a:t>
             </a:r>
             <a:endParaRPr lang="nl-NL"/>
@@ -542,35 +543,35 @@
           <a:p>
             <a:pPr lvl="0"/>
             <a:r>
-              <a:rPr lang="en-US" smtClean="0"/>
+              <a:rPr lang="en-US"/>
               <a:t>Click to edit Master text styles</a:t>
             </a:r>
           </a:p>
           <a:p>
             <a:pPr lvl="1"/>
             <a:r>
-              <a:rPr lang="en-US" smtClean="0"/>
+              <a:rPr lang="en-US"/>
               <a:t>Second level</a:t>
             </a:r>
           </a:p>
           <a:p>
             <a:pPr lvl="2"/>
             <a:r>
-              <a:rPr lang="en-US" smtClean="0"/>
+              <a:rPr lang="en-US"/>
               <a:t>Third level</a:t>
             </a:r>
           </a:p>
           <a:p>
             <a:pPr lvl="3"/>
             <a:r>
-              <a:rPr lang="en-US" smtClean="0"/>
+              <a:rPr lang="en-US"/>
               <a:t>Fourth level</a:t>
             </a:r>
           </a:p>
           <a:p>
             <a:pPr lvl="4"/>
             <a:r>
-              <a:rPr lang="en-US" smtClean="0"/>
+              <a:rPr lang="en-US"/>
               <a:t>Fifth level</a:t>
             </a:r>
             <a:endParaRPr lang="nl-NL"/>
@@ -594,7 +595,7 @@
           <a:p>
             <a:fld id="{1C607521-F3C3-4241-B9F9-5903AE8EACB6}" type="datetimeFigureOut">
               <a:rPr lang="nl-NL" smtClean="0"/>
-              <a:t>2-7-2016</a:t>
+              <a:t>25-1-2017</a:t>
             </a:fld>
             <a:endParaRPr lang="nl-NL"/>
           </a:p>
@@ -688,7 +689,7 @@
           <a:lstStyle/>
           <a:p>
             <a:r>
-              <a:rPr lang="en-US" smtClean="0"/>
+              <a:rPr lang="en-US"/>
               <a:t>Click to edit Master title style</a:t>
             </a:r>
             <a:endParaRPr lang="nl-NL"/>
@@ -712,35 +713,35 @@
           <a:p>
             <a:pPr lvl="0"/>
             <a:r>
-              <a:rPr lang="en-US" smtClean="0"/>
+              <a:rPr lang="en-US"/>
               <a:t>Click to edit Master text styles</a:t>
             </a:r>
           </a:p>
           <a:p>
             <a:pPr lvl="1"/>
             <a:r>
-              <a:rPr lang="en-US" smtClean="0"/>
+              <a:rPr lang="en-US"/>
               <a:t>Second level</a:t>
             </a:r>
           </a:p>
           <a:p>
             <a:pPr lvl="2"/>
             <a:r>
-              <a:rPr lang="en-US" smtClean="0"/>
+              <a:rPr lang="en-US"/>
               <a:t>Third level</a:t>
             </a:r>
           </a:p>
           <a:p>
             <a:pPr lvl="3"/>
             <a:r>
-              <a:rPr lang="en-US" smtClean="0"/>
+              <a:rPr lang="en-US"/>
               <a:t>Fourth level</a:t>
             </a:r>
           </a:p>
           <a:p>
             <a:pPr lvl="4"/>
             <a:r>
-              <a:rPr lang="en-US" smtClean="0"/>
+              <a:rPr lang="en-US"/>
               <a:t>Fifth level</a:t>
             </a:r>
             <a:endParaRPr lang="nl-NL"/>
@@ -764,7 +765,7 @@
           <a:p>
             <a:fld id="{1C607521-F3C3-4241-B9F9-5903AE8EACB6}" type="datetimeFigureOut">
               <a:rPr lang="nl-NL" smtClean="0"/>
-              <a:t>2-7-2016</a:t>
+              <a:t>25-1-2017</a:t>
             </a:fld>
             <a:endParaRPr lang="nl-NL"/>
           </a:p>
@@ -867,7 +868,7 @@
           </a:lstStyle>
           <a:p>
             <a:r>
-              <a:rPr lang="en-US" smtClean="0"/>
+              <a:rPr lang="en-US"/>
               <a:t>Click to edit Master title style</a:t>
             </a:r>
             <a:endParaRPr lang="nl-NL"/>
@@ -987,7 +988,7 @@
           <a:p>
             <a:pPr lvl="0"/>
             <a:r>
-              <a:rPr lang="en-US" smtClean="0"/>
+              <a:rPr lang="en-US"/>
               <a:t>Click to edit Master text styles</a:t>
             </a:r>
           </a:p>
@@ -1010,7 +1011,7 @@
           <a:p>
             <a:fld id="{1C607521-F3C3-4241-B9F9-5903AE8EACB6}" type="datetimeFigureOut">
               <a:rPr lang="nl-NL" smtClean="0"/>
-              <a:t>2-7-2016</a:t>
+              <a:t>25-1-2017</a:t>
             </a:fld>
             <a:endParaRPr lang="nl-NL"/>
           </a:p>
@@ -1104,7 +1105,7 @@
           <a:lstStyle/>
           <a:p>
             <a:r>
-              <a:rPr lang="en-US" smtClean="0"/>
+              <a:rPr lang="en-US"/>
               <a:t>Click to edit Master title style</a:t>
             </a:r>
             <a:endParaRPr lang="nl-NL"/>
@@ -1133,35 +1134,35 @@
           <a:p>
             <a:pPr lvl="0"/>
             <a:r>
-              <a:rPr lang="en-US" smtClean="0"/>
+              <a:rPr lang="en-US"/>
               <a:t>Click to edit Master text styles</a:t>
             </a:r>
           </a:p>
           <a:p>
             <a:pPr lvl="1"/>
             <a:r>
-              <a:rPr lang="en-US" smtClean="0"/>
+              <a:rPr lang="en-US"/>
               <a:t>Second level</a:t>
             </a:r>
           </a:p>
           <a:p>
             <a:pPr lvl="2"/>
             <a:r>
-              <a:rPr lang="en-US" smtClean="0"/>
+              <a:rPr lang="en-US"/>
               <a:t>Third level</a:t>
             </a:r>
           </a:p>
           <a:p>
             <a:pPr lvl="3"/>
             <a:r>
-              <a:rPr lang="en-US" smtClean="0"/>
+              <a:rPr lang="en-US"/>
               <a:t>Fourth level</a:t>
             </a:r>
           </a:p>
           <a:p>
             <a:pPr lvl="4"/>
             <a:r>
-              <a:rPr lang="en-US" smtClean="0"/>
+              <a:rPr lang="en-US"/>
               <a:t>Fifth level</a:t>
             </a:r>
             <a:endParaRPr lang="nl-NL"/>
@@ -1190,35 +1191,35 @@
           <a:p>
             <a:pPr lvl="0"/>
             <a:r>
-              <a:rPr lang="en-US" smtClean="0"/>
+              <a:rPr lang="en-US"/>
               <a:t>Click to edit Master text styles</a:t>
             </a:r>
           </a:p>
           <a:p>
             <a:pPr lvl="1"/>
             <a:r>
-              <a:rPr lang="en-US" smtClean="0"/>
+              <a:rPr lang="en-US"/>
               <a:t>Second level</a:t>
             </a:r>
           </a:p>
           <a:p>
             <a:pPr lvl="2"/>
             <a:r>
-              <a:rPr lang="en-US" smtClean="0"/>
+              <a:rPr lang="en-US"/>
               <a:t>Third level</a:t>
             </a:r>
           </a:p>
           <a:p>
             <a:pPr lvl="3"/>
             <a:r>
-              <a:rPr lang="en-US" smtClean="0"/>
+              <a:rPr lang="en-US"/>
               <a:t>Fourth level</a:t>
             </a:r>
           </a:p>
           <a:p>
             <a:pPr lvl="4"/>
             <a:r>
-              <a:rPr lang="en-US" smtClean="0"/>
+              <a:rPr lang="en-US"/>
               <a:t>Fifth level</a:t>
             </a:r>
             <a:endParaRPr lang="nl-NL"/>
@@ -1242,7 +1243,7 @@
           <a:p>
             <a:fld id="{1C607521-F3C3-4241-B9F9-5903AE8EACB6}" type="datetimeFigureOut">
               <a:rPr lang="nl-NL" smtClean="0"/>
-              <a:t>2-7-2016</a:t>
+              <a:t>25-1-2017</a:t>
             </a:fld>
             <a:endParaRPr lang="nl-NL"/>
           </a:p>
@@ -1341,7 +1342,7 @@
           <a:lstStyle/>
           <a:p>
             <a:r>
-              <a:rPr lang="en-US" smtClean="0"/>
+              <a:rPr lang="en-US"/>
               <a:t>Click to edit Master title style</a:t>
             </a:r>
             <a:endParaRPr lang="nl-NL"/>
@@ -1407,7 +1408,7 @@
           <a:p>
             <a:pPr lvl="0"/>
             <a:r>
-              <a:rPr lang="en-US" smtClean="0"/>
+              <a:rPr lang="en-US"/>
               <a:t>Click to edit Master text styles</a:t>
             </a:r>
           </a:p>
@@ -1435,35 +1436,35 @@
           <a:p>
             <a:pPr lvl="0"/>
             <a:r>
-              <a:rPr lang="en-US" smtClean="0"/>
+              <a:rPr lang="en-US"/>
               <a:t>Click to edit Master text styles</a:t>
             </a:r>
           </a:p>
           <a:p>
             <a:pPr lvl="1"/>
             <a:r>
-              <a:rPr lang="en-US" smtClean="0"/>
+              <a:rPr lang="en-US"/>
               <a:t>Second level</a:t>
             </a:r>
           </a:p>
           <a:p>
             <a:pPr lvl="2"/>
             <a:r>
-              <a:rPr lang="en-US" smtClean="0"/>
+              <a:rPr lang="en-US"/>
               <a:t>Third level</a:t>
             </a:r>
           </a:p>
           <a:p>
             <a:pPr lvl="3"/>
             <a:r>
-              <a:rPr lang="en-US" smtClean="0"/>
+              <a:rPr lang="en-US"/>
               <a:t>Fourth level</a:t>
             </a:r>
           </a:p>
           <a:p>
             <a:pPr lvl="4"/>
             <a:r>
-              <a:rPr lang="en-US" smtClean="0"/>
+              <a:rPr lang="en-US"/>
               <a:t>Fifth level</a:t>
             </a:r>
             <a:endParaRPr lang="nl-NL"/>
@@ -1529,7 +1530,7 @@
           <a:p>
             <a:pPr lvl="0"/>
             <a:r>
-              <a:rPr lang="en-US" smtClean="0"/>
+              <a:rPr lang="en-US"/>
               <a:t>Click to edit Master text styles</a:t>
             </a:r>
           </a:p>
@@ -1557,35 +1558,35 @@
           <a:p>
             <a:pPr lvl="0"/>
             <a:r>
-              <a:rPr lang="en-US" smtClean="0"/>
+              <a:rPr lang="en-US"/>
               <a:t>Click to edit Master text styles</a:t>
             </a:r>
           </a:p>
           <a:p>
             <a:pPr lvl="1"/>
             <a:r>
-              <a:rPr lang="en-US" smtClean="0"/>
+              <a:rPr lang="en-US"/>
               <a:t>Second level</a:t>
             </a:r>
           </a:p>
           <a:p>
             <a:pPr lvl="2"/>
             <a:r>
-              <a:rPr lang="en-US" smtClean="0"/>
+              <a:rPr lang="en-US"/>
               <a:t>Third level</a:t>
             </a:r>
           </a:p>
           <a:p>
             <a:pPr lvl="3"/>
             <a:r>
-              <a:rPr lang="en-US" smtClean="0"/>
+              <a:rPr lang="en-US"/>
               <a:t>Fourth level</a:t>
             </a:r>
           </a:p>
           <a:p>
             <a:pPr lvl="4"/>
             <a:r>
-              <a:rPr lang="en-US" smtClean="0"/>
+              <a:rPr lang="en-US"/>
               <a:t>Fifth level</a:t>
             </a:r>
             <a:endParaRPr lang="nl-NL"/>
@@ -1609,7 +1610,7 @@
           <a:p>
             <a:fld id="{1C607521-F3C3-4241-B9F9-5903AE8EACB6}" type="datetimeFigureOut">
               <a:rPr lang="nl-NL" smtClean="0"/>
-              <a:t>2-7-2016</a:t>
+              <a:t>25-1-2017</a:t>
             </a:fld>
             <a:endParaRPr lang="nl-NL"/>
           </a:p>
@@ -1703,7 +1704,7 @@
           <a:lstStyle/>
           <a:p>
             <a:r>
-              <a:rPr lang="en-US" smtClean="0"/>
+              <a:rPr lang="en-US"/>
               <a:t>Click to edit Master title style</a:t>
             </a:r>
             <a:endParaRPr lang="nl-NL"/>
@@ -1727,7 +1728,7 @@
           <a:p>
             <a:fld id="{1C607521-F3C3-4241-B9F9-5903AE8EACB6}" type="datetimeFigureOut">
               <a:rPr lang="nl-NL" smtClean="0"/>
-              <a:t>2-7-2016</a:t>
+              <a:t>25-1-2017</a:t>
             </a:fld>
             <a:endParaRPr lang="nl-NL"/>
           </a:p>
@@ -1822,7 +1823,7 @@
           <a:p>
             <a:fld id="{1C607521-F3C3-4241-B9F9-5903AE8EACB6}" type="datetimeFigureOut">
               <a:rPr lang="nl-NL" smtClean="0"/>
-              <a:t>2-7-2016</a:t>
+              <a:t>25-1-2017</a:t>
             </a:fld>
             <a:endParaRPr lang="nl-NL"/>
           </a:p>
@@ -1925,7 +1926,7 @@
           </a:lstStyle>
           <a:p>
             <a:r>
-              <a:rPr lang="en-US" smtClean="0"/>
+              <a:rPr lang="en-US"/>
               <a:t>Click to edit Master title style</a:t>
             </a:r>
             <a:endParaRPr lang="nl-NL"/>
@@ -1982,35 +1983,35 @@
           <a:p>
             <a:pPr lvl="0"/>
             <a:r>
-              <a:rPr lang="en-US" smtClean="0"/>
+              <a:rPr lang="en-US"/>
               <a:t>Click to edit Master text styles</a:t>
             </a:r>
           </a:p>
           <a:p>
             <a:pPr lvl="1"/>
             <a:r>
-              <a:rPr lang="en-US" smtClean="0"/>
+              <a:rPr lang="en-US"/>
               <a:t>Second level</a:t>
             </a:r>
           </a:p>
           <a:p>
             <a:pPr lvl="2"/>
             <a:r>
-              <a:rPr lang="en-US" smtClean="0"/>
+              <a:rPr lang="en-US"/>
               <a:t>Third level</a:t>
             </a:r>
           </a:p>
           <a:p>
             <a:pPr lvl="3"/>
             <a:r>
-              <a:rPr lang="en-US" smtClean="0"/>
+              <a:rPr lang="en-US"/>
               <a:t>Fourth level</a:t>
             </a:r>
           </a:p>
           <a:p>
             <a:pPr lvl="4"/>
             <a:r>
-              <a:rPr lang="en-US" smtClean="0"/>
+              <a:rPr lang="en-US"/>
               <a:t>Fifth level</a:t>
             </a:r>
             <a:endParaRPr lang="nl-NL"/>
@@ -2076,7 +2077,7 @@
           <a:p>
             <a:pPr lvl="0"/>
             <a:r>
-              <a:rPr lang="en-US" smtClean="0"/>
+              <a:rPr lang="en-US"/>
               <a:t>Click to edit Master text styles</a:t>
             </a:r>
           </a:p>
@@ -2099,7 +2100,7 @@
           <a:p>
             <a:fld id="{1C607521-F3C3-4241-B9F9-5903AE8EACB6}" type="datetimeFigureOut">
               <a:rPr lang="nl-NL" smtClean="0"/>
-              <a:t>2-7-2016</a:t>
+              <a:t>25-1-2017</a:t>
             </a:fld>
             <a:endParaRPr lang="nl-NL"/>
           </a:p>
@@ -2202,7 +2203,7 @@
           </a:lstStyle>
           <a:p>
             <a:r>
-              <a:rPr lang="en-US" smtClean="0"/>
+              <a:rPr lang="en-US"/>
               <a:t>Click to edit Master title style</a:t>
             </a:r>
             <a:endParaRPr lang="nl-NL"/>
@@ -2329,7 +2330,7 @@
           <a:p>
             <a:pPr lvl="0"/>
             <a:r>
-              <a:rPr lang="en-US" smtClean="0"/>
+              <a:rPr lang="en-US"/>
               <a:t>Click to edit Master text styles</a:t>
             </a:r>
           </a:p>
@@ -2352,7 +2353,7 @@
           <a:p>
             <a:fld id="{1C607521-F3C3-4241-B9F9-5903AE8EACB6}" type="datetimeFigureOut">
               <a:rPr lang="nl-NL" smtClean="0"/>
-              <a:t>2-7-2016</a:t>
+              <a:t>25-1-2017</a:t>
             </a:fld>
             <a:endParaRPr lang="nl-NL"/>
           </a:p>
@@ -2461,7 +2462,7 @@
           <a:lstStyle/>
           <a:p>
             <a:r>
-              <a:rPr lang="en-US" smtClean="0"/>
+              <a:rPr lang="en-US"/>
               <a:t>Click to edit Master title style</a:t>
             </a:r>
             <a:endParaRPr lang="nl-NL"/>
@@ -2495,35 +2496,35 @@
           <a:p>
             <a:pPr lvl="0"/>
             <a:r>
-              <a:rPr lang="en-US" smtClean="0"/>
+              <a:rPr lang="en-US"/>
               <a:t>Click to edit Master text styles</a:t>
             </a:r>
           </a:p>
           <a:p>
             <a:pPr lvl="1"/>
             <a:r>
-              <a:rPr lang="en-US" smtClean="0"/>
+              <a:rPr lang="en-US"/>
               <a:t>Second level</a:t>
             </a:r>
           </a:p>
           <a:p>
             <a:pPr lvl="2"/>
             <a:r>
-              <a:rPr lang="en-US" smtClean="0"/>
+              <a:rPr lang="en-US"/>
               <a:t>Third level</a:t>
             </a:r>
           </a:p>
           <a:p>
             <a:pPr lvl="3"/>
             <a:r>
-              <a:rPr lang="en-US" smtClean="0"/>
+              <a:rPr lang="en-US"/>
               <a:t>Fourth level</a:t>
             </a:r>
           </a:p>
           <a:p>
             <a:pPr lvl="4"/>
             <a:r>
-              <a:rPr lang="en-US" smtClean="0"/>
+              <a:rPr lang="en-US"/>
               <a:t>Fifth level</a:t>
             </a:r>
             <a:endParaRPr lang="nl-NL"/>
@@ -2565,7 +2566,7 @@
           <a:p>
             <a:fld id="{1C607521-F3C3-4241-B9F9-5903AE8EACB6}" type="datetimeFigureOut">
               <a:rPr lang="nl-NL" smtClean="0"/>
-              <a:t>2-7-2016</a:t>
+              <a:t>25-1-2017</a:t>
             </a:fld>
             <a:endParaRPr lang="nl-NL"/>
           </a:p>
@@ -3007,7 +3008,7 @@
           <a:p>
             <a:pPr algn="ctr"/>
             <a:r>
-              <a:rPr lang="en-US" dirty="0" smtClean="0"/>
+              <a:rPr lang="en-US" dirty="0"/>
               <a:t>CPU</a:t>
             </a:r>
             <a:endParaRPr lang="nl-NL" dirty="0"/>
@@ -3051,7 +3052,7 @@
           <a:p>
             <a:pPr algn="ctr"/>
             <a:r>
-              <a:rPr lang="en-US" dirty="0" smtClean="0"/>
+              <a:rPr lang="en-US" dirty="0"/>
               <a:t>MMU</a:t>
             </a:r>
             <a:endParaRPr lang="nl-NL" dirty="0"/>
@@ -3095,7 +3096,7 @@
           <a:p>
             <a:pPr algn="ctr"/>
             <a:r>
-              <a:rPr lang="en-US" dirty="0" smtClean="0"/>
+              <a:rPr lang="en-US" dirty="0"/>
               <a:t>RAM</a:t>
             </a:r>
             <a:endParaRPr lang="nl-NL" dirty="0"/>
@@ -3139,14 +3140,14 @@
           <a:p>
             <a:pPr algn="ctr"/>
             <a:r>
-              <a:rPr lang="en-US" dirty="0" smtClean="0"/>
+              <a:rPr lang="en-US" dirty="0"/>
               <a:t>Sys</a:t>
             </a:r>
           </a:p>
           <a:p>
             <a:pPr algn="ctr"/>
             <a:r>
-              <a:rPr lang="en-US" dirty="0" smtClean="0"/>
+              <a:rPr lang="en-US" dirty="0"/>
               <a:t>Ctrl</a:t>
             </a:r>
             <a:endParaRPr lang="nl-NL" dirty="0"/>
@@ -3190,7 +3191,7 @@
           <a:p>
             <a:pPr algn="ctr"/>
             <a:r>
-              <a:rPr lang="en-US" dirty="0" smtClean="0"/>
+              <a:rPr lang="en-US" dirty="0"/>
               <a:t>Logic</a:t>
             </a:r>
             <a:endParaRPr lang="nl-NL" dirty="0"/>
@@ -3461,7 +3462,7 @@
           <a:lstStyle/>
           <a:p>
             <a:r>
-              <a:rPr lang="en-US" sz="1000" dirty="0" smtClean="0"/>
+              <a:rPr lang="en-US" sz="1000" dirty="0"/>
               <a:t>A12-A15</a:t>
             </a:r>
             <a:endParaRPr lang="nl-NL" sz="1000" dirty="0"/>
@@ -3491,7 +3492,7 @@
           <a:lstStyle/>
           <a:p>
             <a:r>
-              <a:rPr lang="en-US" sz="1000" dirty="0" smtClean="0"/>
+              <a:rPr lang="en-US" sz="1000" dirty="0"/>
               <a:t>A0-A15</a:t>
             </a:r>
             <a:endParaRPr lang="nl-NL" sz="1000" dirty="0"/>
@@ -3557,7 +3558,7 @@
           <a:lstStyle/>
           <a:p>
             <a:r>
-              <a:rPr lang="en-US" sz="1000" dirty="0" smtClean="0"/>
+              <a:rPr lang="en-US" sz="1000" dirty="0"/>
               <a:t>MA12-MA19</a:t>
             </a:r>
             <a:endParaRPr lang="nl-NL" sz="1000" dirty="0"/>
@@ -3587,7 +3588,7 @@
           <a:lstStyle/>
           <a:p>
             <a:r>
-              <a:rPr lang="en-US" sz="1000" dirty="0" smtClean="0"/>
+              <a:rPr lang="en-US" sz="1000" dirty="0"/>
               <a:t>D0-D7</a:t>
             </a:r>
             <a:endParaRPr lang="nl-NL" sz="1000" dirty="0"/>
@@ -3747,7 +3748,7 @@
           <a:lstStyle/>
           <a:p>
             <a:r>
-              <a:rPr lang="en-US" sz="1000" dirty="0" smtClean="0"/>
+              <a:rPr lang="en-US" sz="1000" dirty="0"/>
               <a:t>A0-A15</a:t>
             </a:r>
             <a:endParaRPr lang="nl-NL" sz="1000" dirty="0"/>
@@ -3777,13 +3778,13 @@
           <a:lstStyle/>
           <a:p>
             <a:r>
-              <a:rPr lang="en-US" sz="1000" dirty="0" smtClean="0"/>
+              <a:rPr lang="en-US" sz="1000" dirty="0"/>
               <a:t>A0-A11</a:t>
             </a:r>
           </a:p>
           <a:p>
             <a:r>
-              <a:rPr lang="en-US" sz="1000" dirty="0" smtClean="0"/>
+              <a:rPr lang="en-US" sz="1000" dirty="0"/>
               <a:t>MA12-MA19</a:t>
             </a:r>
             <a:endParaRPr lang="nl-NL" sz="1000" dirty="0"/>
@@ -3813,13 +3814,13 @@
           <a:lstStyle/>
           <a:p>
             <a:r>
-              <a:rPr lang="en-US" sz="1000" dirty="0" smtClean="0"/>
+              <a:rPr lang="en-US" sz="1000" dirty="0"/>
               <a:t>A0-A15</a:t>
             </a:r>
           </a:p>
           <a:p>
             <a:r>
-              <a:rPr lang="en-US" sz="1000" dirty="0" smtClean="0"/>
+              <a:rPr lang="en-US" sz="1000" dirty="0"/>
               <a:t>MA12-MA19</a:t>
             </a:r>
             <a:endParaRPr lang="nl-NL" sz="1000" dirty="0"/>
@@ -3964,7 +3965,7 @@
           <a:lstStyle/>
           <a:p>
             <a:r>
-              <a:rPr lang="en-US" sz="1000" dirty="0" smtClean="0"/>
+              <a:rPr lang="en-US" sz="1000" dirty="0"/>
               <a:t>D0-D7</a:t>
             </a:r>
             <a:endParaRPr lang="nl-NL" sz="1000" dirty="0"/>
@@ -3994,7 +3995,7 @@
           <a:lstStyle/>
           <a:p>
             <a:r>
-              <a:rPr lang="en-US" sz="1000" dirty="0" smtClean="0"/>
+              <a:rPr lang="en-US" sz="1000" dirty="0"/>
               <a:t>Enable</a:t>
             </a:r>
             <a:endParaRPr lang="nl-NL" sz="1000" dirty="0"/>
@@ -4024,7 +4025,7 @@
           <a:lstStyle/>
           <a:p>
             <a:r>
-              <a:rPr lang="en-US" sz="1000" dirty="0" smtClean="0"/>
+              <a:rPr lang="en-US" sz="1000" dirty="0"/>
               <a:t>IO-ctrl</a:t>
             </a:r>
             <a:endParaRPr lang="nl-NL" sz="1000" dirty="0"/>
@@ -4054,7 +4055,7 @@
           <a:lstStyle/>
           <a:p>
             <a:r>
-              <a:rPr lang="en-US" sz="1000" dirty="0" smtClean="0"/>
+              <a:rPr lang="en-US" sz="1000" dirty="0"/>
               <a:t>Bus-ctrl</a:t>
             </a:r>
             <a:endParaRPr lang="nl-NL" sz="1000" dirty="0"/>
@@ -4125,7 +4126,7 @@
           <a:lstStyle/>
           <a:p>
             <a:r>
-              <a:rPr lang="en-US" sz="1000" dirty="0" smtClean="0"/>
+              <a:rPr lang="en-US" sz="1000" dirty="0"/>
               <a:t>Serial</a:t>
             </a:r>
             <a:endParaRPr lang="nl-NL" sz="1000" dirty="0"/>
@@ -4155,7 +4156,7 @@
           <a:lstStyle/>
           <a:p>
             <a:r>
-              <a:rPr lang="en-US" sz="1000" dirty="0" smtClean="0"/>
+              <a:rPr lang="en-US" sz="1000" dirty="0"/>
               <a:t>Z80</a:t>
             </a:r>
             <a:endParaRPr lang="nl-NL" sz="1000" dirty="0"/>
@@ -4185,7 +4186,7 @@
           <a:lstStyle/>
           <a:p>
             <a:r>
-              <a:rPr lang="en-US" sz="1000" dirty="0" smtClean="0"/>
+              <a:rPr lang="en-US" sz="1000" dirty="0"/>
               <a:t>PSoC5</a:t>
             </a:r>
             <a:endParaRPr lang="nl-NL" sz="1000" dirty="0"/>
@@ -4215,7 +4216,7 @@
           <a:lstStyle/>
           <a:p>
             <a:r>
-              <a:rPr lang="en-US" sz="1000" dirty="0" smtClean="0"/>
+              <a:rPr lang="en-US" sz="1000" dirty="0"/>
               <a:t>EPM240</a:t>
             </a:r>
             <a:endParaRPr lang="nl-NL" sz="1000" dirty="0"/>
@@ -4245,13 +4246,13 @@
           <a:lstStyle/>
           <a:p>
             <a:r>
-              <a:rPr lang="en-US" sz="1000" dirty="0" smtClean="0"/>
+              <a:rPr lang="en-US" sz="1000" dirty="0"/>
               <a:t>IO addresses: A0-A15</a:t>
             </a:r>
           </a:p>
           <a:p>
             <a:r>
-              <a:rPr lang="en-US" sz="1000" dirty="0" smtClean="0"/>
+              <a:rPr lang="en-US" sz="1000" dirty="0"/>
               <a:t>Mem addresses: A0-A11 MA-12-MA19 (1MB)</a:t>
             </a:r>
           </a:p>
@@ -4324,14 +4325,14 @@
           <a:p>
             <a:pPr algn="ctr"/>
             <a:r>
-              <a:rPr lang="en-US" dirty="0" smtClean="0"/>
+              <a:rPr lang="en-US" dirty="0"/>
               <a:t>IO</a:t>
             </a:r>
           </a:p>
           <a:p>
             <a:pPr algn="ctr"/>
             <a:r>
-              <a:rPr lang="en-US" dirty="0" smtClean="0"/>
+              <a:rPr lang="en-US" dirty="0"/>
               <a:t>Ctrl</a:t>
             </a:r>
             <a:endParaRPr lang="nl-NL" dirty="0"/>
@@ -4412,14 +4413,14 @@
           <a:p>
             <a:pPr algn="ctr"/>
             <a:r>
-              <a:rPr lang="en-US" dirty="0" smtClean="0"/>
+              <a:rPr lang="en-US" dirty="0"/>
               <a:t>IO</a:t>
             </a:r>
           </a:p>
           <a:p>
             <a:pPr algn="ctr"/>
             <a:r>
-              <a:rPr lang="en-US" dirty="0" smtClean="0"/>
+              <a:rPr lang="en-US" dirty="0"/>
               <a:t>RAM</a:t>
             </a:r>
             <a:endParaRPr lang="nl-NL" dirty="0"/>
@@ -4463,14 +4464,14 @@
           <a:p>
             <a:pPr algn="ctr"/>
             <a:r>
-              <a:rPr lang="en-US" dirty="0" smtClean="0"/>
+              <a:rPr lang="en-US" dirty="0"/>
               <a:t>IO</a:t>
             </a:r>
           </a:p>
           <a:p>
             <a:pPr algn="ctr"/>
             <a:r>
-              <a:rPr lang="en-US" dirty="0" smtClean="0"/>
+              <a:rPr lang="en-US" dirty="0"/>
               <a:t>Device</a:t>
             </a:r>
             <a:endParaRPr lang="nl-NL" dirty="0"/>
@@ -4514,14 +4515,14 @@
           <a:p>
             <a:pPr algn="ctr"/>
             <a:r>
-              <a:rPr lang="en-US" dirty="0" smtClean="0"/>
+              <a:rPr lang="en-US" dirty="0"/>
               <a:t>IO</a:t>
             </a:r>
           </a:p>
           <a:p>
             <a:pPr algn="ctr"/>
             <a:r>
-              <a:rPr lang="en-US" dirty="0" smtClean="0"/>
+              <a:rPr lang="en-US" dirty="0"/>
               <a:t>Device</a:t>
             </a:r>
             <a:endParaRPr lang="nl-NL" dirty="0"/>
@@ -4565,15 +4566,14 @@
           <a:p>
             <a:pPr algn="ctr"/>
             <a:r>
-              <a:rPr lang="en-US" dirty="0" smtClean="0"/>
+              <a:rPr lang="en-US" dirty="0"/>
               <a:t>Any</a:t>
             </a:r>
-            <a:endParaRPr lang="en-US" dirty="0" smtClean="0"/>
           </a:p>
           <a:p>
             <a:pPr algn="ctr"/>
             <a:r>
-              <a:rPr lang="en-US" dirty="0" smtClean="0"/>
+              <a:rPr lang="en-US" dirty="0"/>
               <a:t>Device</a:t>
             </a:r>
             <a:endParaRPr lang="nl-NL" dirty="0"/>
@@ -4617,7 +4617,7 @@
           <a:p>
             <a:pPr algn="ctr"/>
             <a:r>
-              <a:rPr lang="en-US" dirty="0" smtClean="0"/>
+              <a:rPr lang="en-US" dirty="0"/>
               <a:t>CPU</a:t>
             </a:r>
           </a:p>
@@ -4982,7 +4982,7 @@
           <a:lstStyle/>
           <a:p>
             <a:r>
-              <a:rPr lang="en-US" sz="1000" dirty="0" smtClean="0"/>
+              <a:rPr lang="en-US" sz="1000" dirty="0"/>
               <a:t>Storage</a:t>
             </a:r>
           </a:p>
@@ -5011,7 +5011,7 @@
           <a:lstStyle/>
           <a:p>
             <a:r>
-              <a:rPr lang="en-US" sz="1000" dirty="0" smtClean="0"/>
+              <a:rPr lang="en-US" sz="1000" dirty="0"/>
               <a:t>Network</a:t>
             </a:r>
             <a:endParaRPr lang="nl-NL" sz="1000" dirty="0"/>
@@ -5041,7 +5041,7 @@
           <a:lstStyle/>
           <a:p>
             <a:r>
-              <a:rPr lang="en-US" sz="1000" dirty="0" smtClean="0"/>
+              <a:rPr lang="en-US" sz="1000" dirty="0"/>
               <a:t>Dual ported</a:t>
             </a:r>
             <a:endParaRPr lang="nl-NL" sz="1000" dirty="0"/>
@@ -5104,13 +5104,13 @@
           <a:lstStyle/>
           <a:p>
             <a:r>
-              <a:rPr lang="en-US" sz="1000" dirty="0" smtClean="0"/>
+              <a:rPr lang="en-US" sz="1000" dirty="0"/>
               <a:t>RAM mapped</a:t>
             </a:r>
           </a:p>
           <a:p>
             <a:r>
-              <a:rPr lang="en-US" sz="1000" dirty="0" smtClean="0"/>
+              <a:rPr lang="en-US" sz="1000" dirty="0"/>
               <a:t>into CPU space</a:t>
             </a:r>
             <a:endParaRPr lang="nl-NL" sz="1000" dirty="0"/>
@@ -5140,10 +5140,9 @@
           <a:lstStyle/>
           <a:p>
             <a:r>
-              <a:rPr lang="en-US" sz="1000" dirty="0" smtClean="0"/>
+              <a:rPr lang="en-US" sz="1000" dirty="0"/>
               <a:t>Server</a:t>
             </a:r>
-            <a:endParaRPr lang="en-US" sz="1000" dirty="0" smtClean="0"/>
           </a:p>
         </p:txBody>
       </p:sp>
@@ -5151,6 +5150,558 @@
     <p:extLst>
       <p:ext uri="{BB962C8B-B14F-4D97-AF65-F5344CB8AC3E}">
         <p14:creationId xmlns:p14="http://schemas.microsoft.com/office/powerpoint/2010/main" val="3481543463"/>
+      </p:ext>
+    </p:extLst>
+  </p:cSld>
+  <p:clrMapOvr>
+    <a:masterClrMapping/>
+  </p:clrMapOvr>
+</p:sld>
+</file>
+
+<file path=ppt/slides/slide3.xml><?xml version="1.0" encoding="utf-8"?>
+<p:sld xmlns:a="http://schemas.openxmlformats.org/drawingml/2006/main" xmlns:r="http://schemas.openxmlformats.org/officeDocument/2006/relationships" xmlns:p="http://schemas.openxmlformats.org/presentationml/2006/main">
+  <p:cSld>
+    <p:spTree>
+      <p:nvGrpSpPr>
+        <p:cNvPr id="1" name=""/>
+        <p:cNvGrpSpPr/>
+        <p:nvPr/>
+      </p:nvGrpSpPr>
+      <p:grpSpPr>
+        <a:xfrm>
+          <a:off x="0" y="0"/>
+          <a:ext cx="0" cy="0"/>
+          <a:chOff x="0" y="0"/>
+          <a:chExt cx="0" cy="0"/>
+        </a:xfrm>
+      </p:grpSpPr>
+      <p:sp>
+        <p:nvSpPr>
+          <p:cNvPr id="4" name="Rectangle 3"/>
+          <p:cNvSpPr/>
+          <p:nvPr/>
+        </p:nvSpPr>
+        <p:spPr>
+          <a:xfrm>
+            <a:off x="1591027" y="2838351"/>
+            <a:ext cx="914400" cy="831273"/>
+          </a:xfrm>
+          <a:prstGeom prst="rect">
+            <a:avLst/>
+          </a:prstGeom>
+        </p:spPr>
+        <p:style>
+          <a:lnRef idx="2">
+            <a:schemeClr val="accent1">
+              <a:shade val="50000"/>
+            </a:schemeClr>
+          </a:lnRef>
+          <a:fillRef idx="1">
+            <a:schemeClr val="accent1"/>
+          </a:fillRef>
+          <a:effectRef idx="0">
+            <a:schemeClr val="accent1"/>
+          </a:effectRef>
+          <a:fontRef idx="minor">
+            <a:schemeClr val="lt1"/>
+          </a:fontRef>
+        </p:style>
+        <p:txBody>
+          <a:bodyPr rtlCol="0" anchor="ctr"/>
+          <a:lstStyle/>
+          <a:p>
+            <a:pPr algn="ctr"/>
+            <a:r>
+              <a:rPr lang="en-US" dirty="0"/>
+              <a:t>CPU</a:t>
+            </a:r>
+          </a:p>
+        </p:txBody>
+      </p:sp>
+      <p:sp>
+        <p:nvSpPr>
+          <p:cNvPr id="5" name="Rectangle 4"/>
+          <p:cNvSpPr/>
+          <p:nvPr/>
+        </p:nvSpPr>
+        <p:spPr>
+          <a:xfrm>
+            <a:off x="5477227" y="2172533"/>
+            <a:ext cx="914400" cy="914400"/>
+          </a:xfrm>
+          <a:prstGeom prst="rect">
+            <a:avLst/>
+          </a:prstGeom>
+        </p:spPr>
+        <p:style>
+          <a:lnRef idx="2">
+            <a:schemeClr val="accent1">
+              <a:shade val="50000"/>
+            </a:schemeClr>
+          </a:lnRef>
+          <a:fillRef idx="1">
+            <a:schemeClr val="accent1"/>
+          </a:fillRef>
+          <a:effectRef idx="0">
+            <a:schemeClr val="accent1"/>
+          </a:effectRef>
+          <a:fontRef idx="minor">
+            <a:schemeClr val="lt1"/>
+          </a:fontRef>
+        </p:style>
+        <p:txBody>
+          <a:bodyPr rtlCol="0" anchor="ctr"/>
+          <a:lstStyle/>
+          <a:p>
+            <a:pPr algn="ctr"/>
+            <a:r>
+              <a:rPr lang="en-US" dirty="0"/>
+              <a:t>Virtual</a:t>
+            </a:r>
+          </a:p>
+          <a:p>
+            <a:pPr algn="ctr"/>
+            <a:r>
+              <a:rPr lang="en-US" dirty="0"/>
+              <a:t>Device</a:t>
+            </a:r>
+            <a:endParaRPr lang="nl-NL" dirty="0"/>
+          </a:p>
+        </p:txBody>
+      </p:sp>
+      <p:sp>
+        <p:nvSpPr>
+          <p:cNvPr id="6" name="Rectangle 5"/>
+          <p:cNvSpPr/>
+          <p:nvPr/>
+        </p:nvSpPr>
+        <p:spPr>
+          <a:xfrm>
+            <a:off x="3182326" y="2796787"/>
+            <a:ext cx="914400" cy="914400"/>
+          </a:xfrm>
+          <a:prstGeom prst="rect">
+            <a:avLst/>
+          </a:prstGeom>
+        </p:spPr>
+        <p:style>
+          <a:lnRef idx="2">
+            <a:schemeClr val="accent1">
+              <a:shade val="50000"/>
+            </a:schemeClr>
+          </a:lnRef>
+          <a:fillRef idx="1">
+            <a:schemeClr val="accent1"/>
+          </a:fillRef>
+          <a:effectRef idx="0">
+            <a:schemeClr val="accent1"/>
+          </a:effectRef>
+          <a:fontRef idx="minor">
+            <a:schemeClr val="lt1"/>
+          </a:fontRef>
+        </p:style>
+        <p:txBody>
+          <a:bodyPr rtlCol="0" anchor="ctr"/>
+          <a:lstStyle/>
+          <a:p>
+            <a:pPr algn="ctr"/>
+            <a:r>
+              <a:rPr lang="en-US" dirty="0" err="1"/>
+              <a:t>PSoC</a:t>
+            </a:r>
+            <a:endParaRPr lang="en-US" dirty="0"/>
+          </a:p>
+        </p:txBody>
+      </p:sp>
+      <p:sp>
+        <p:nvSpPr>
+          <p:cNvPr id="7" name="Rectangle 6"/>
+          <p:cNvSpPr/>
+          <p:nvPr/>
+        </p:nvSpPr>
+        <p:spPr>
+          <a:xfrm>
+            <a:off x="5477227" y="3385872"/>
+            <a:ext cx="914400" cy="914400"/>
+          </a:xfrm>
+          <a:prstGeom prst="rect">
+            <a:avLst/>
+          </a:prstGeom>
+        </p:spPr>
+        <p:style>
+          <a:lnRef idx="2">
+            <a:schemeClr val="accent1">
+              <a:shade val="50000"/>
+            </a:schemeClr>
+          </a:lnRef>
+          <a:fillRef idx="1">
+            <a:schemeClr val="accent1"/>
+          </a:fillRef>
+          <a:effectRef idx="0">
+            <a:schemeClr val="accent1"/>
+          </a:effectRef>
+          <a:fontRef idx="minor">
+            <a:schemeClr val="lt1"/>
+          </a:fontRef>
+        </p:style>
+        <p:txBody>
+          <a:bodyPr rtlCol="0" anchor="ctr"/>
+          <a:lstStyle/>
+          <a:p>
+            <a:pPr algn="ctr"/>
+            <a:r>
+              <a:rPr lang="en-US" dirty="0"/>
+              <a:t>Virtual</a:t>
+            </a:r>
+          </a:p>
+          <a:p>
+            <a:pPr algn="ctr"/>
+            <a:r>
+              <a:rPr lang="en-US" dirty="0"/>
+              <a:t>Device</a:t>
+            </a:r>
+            <a:endParaRPr lang="nl-NL" dirty="0"/>
+          </a:p>
+        </p:txBody>
+      </p:sp>
+      <p:cxnSp>
+        <p:nvCxnSpPr>
+          <p:cNvPr id="9" name="Elbow Connector 8"/>
+          <p:cNvCxnSpPr>
+            <a:stCxn id="6" idx="3"/>
+            <a:endCxn id="7" idx="1"/>
+          </p:cNvCxnSpPr>
+          <p:nvPr/>
+        </p:nvCxnSpPr>
+        <p:spPr>
+          <a:xfrm>
+            <a:off x="4096726" y="3253987"/>
+            <a:ext cx="1380501" cy="589085"/>
+          </a:xfrm>
+          <a:prstGeom prst="bentConnector3">
+            <a:avLst/>
+          </a:prstGeom>
+          <a:ln w="50800">
+            <a:headEnd type="triangle"/>
+            <a:tailEnd type="triangle"/>
+          </a:ln>
+        </p:spPr>
+        <p:style>
+          <a:lnRef idx="3">
+            <a:schemeClr val="accent5"/>
+          </a:lnRef>
+          <a:fillRef idx="0">
+            <a:schemeClr val="accent5"/>
+          </a:fillRef>
+          <a:effectRef idx="2">
+            <a:schemeClr val="accent5"/>
+          </a:effectRef>
+          <a:fontRef idx="minor">
+            <a:schemeClr val="tx1"/>
+          </a:fontRef>
+        </p:style>
+      </p:cxnSp>
+      <p:cxnSp>
+        <p:nvCxnSpPr>
+          <p:cNvPr id="11" name="Elbow Connector 10"/>
+          <p:cNvCxnSpPr>
+            <a:stCxn id="6" idx="3"/>
+            <a:endCxn id="5" idx="1"/>
+          </p:cNvCxnSpPr>
+          <p:nvPr/>
+        </p:nvCxnSpPr>
+        <p:spPr>
+          <a:xfrm flipV="1">
+            <a:off x="4096726" y="2629733"/>
+            <a:ext cx="1380501" cy="624254"/>
+          </a:xfrm>
+          <a:prstGeom prst="bentConnector3">
+            <a:avLst/>
+          </a:prstGeom>
+          <a:ln w="50800">
+            <a:tailEnd type="triangle"/>
+          </a:ln>
+        </p:spPr>
+        <p:style>
+          <a:lnRef idx="3">
+            <a:schemeClr val="accent5"/>
+          </a:lnRef>
+          <a:fillRef idx="0">
+            <a:schemeClr val="accent5"/>
+          </a:fillRef>
+          <a:effectRef idx="2">
+            <a:schemeClr val="accent5"/>
+          </a:effectRef>
+          <a:fontRef idx="minor">
+            <a:schemeClr val="tx1"/>
+          </a:fontRef>
+        </p:style>
+      </p:cxnSp>
+      <p:cxnSp>
+        <p:nvCxnSpPr>
+          <p:cNvPr id="16" name="Elbow Connector 15"/>
+          <p:cNvCxnSpPr>
+            <a:stCxn id="4" idx="3"/>
+            <a:endCxn id="6" idx="1"/>
+          </p:cNvCxnSpPr>
+          <p:nvPr/>
+        </p:nvCxnSpPr>
+        <p:spPr>
+          <a:xfrm flipV="1">
+            <a:off x="2505427" y="3253987"/>
+            <a:ext cx="676899" cy="1"/>
+          </a:xfrm>
+          <a:prstGeom prst="bentConnector3">
+            <a:avLst/>
+          </a:prstGeom>
+          <a:ln w="50800">
+            <a:solidFill>
+              <a:srgbClr val="C00000"/>
+            </a:solidFill>
+            <a:headEnd type="triangle"/>
+            <a:tailEnd type="triangle"/>
+          </a:ln>
+        </p:spPr>
+        <p:style>
+          <a:lnRef idx="3">
+            <a:schemeClr val="accent5"/>
+          </a:lnRef>
+          <a:fillRef idx="0">
+            <a:schemeClr val="accent5"/>
+          </a:fillRef>
+          <a:effectRef idx="2">
+            <a:schemeClr val="accent5"/>
+          </a:effectRef>
+          <a:fontRef idx="minor">
+            <a:schemeClr val="tx1"/>
+          </a:fontRef>
+        </p:style>
+      </p:cxnSp>
+      <p:sp>
+        <p:nvSpPr>
+          <p:cNvPr id="23" name="Rounded Rectangle 22"/>
+          <p:cNvSpPr/>
+          <p:nvPr/>
+        </p:nvSpPr>
+        <p:spPr>
+          <a:xfrm>
+            <a:off x="1332089" y="2528711"/>
+            <a:ext cx="3059289" cy="1399822"/>
+          </a:xfrm>
+          <a:prstGeom prst="roundRect">
+            <a:avLst/>
+          </a:prstGeom>
+          <a:solidFill>
+            <a:schemeClr val="bg1">
+              <a:alpha val="0"/>
+            </a:schemeClr>
+          </a:solidFill>
+          <a:ln>
+            <a:prstDash val="dash"/>
+          </a:ln>
+        </p:spPr>
+        <p:style>
+          <a:lnRef idx="2">
+            <a:schemeClr val="accent1">
+              <a:shade val="50000"/>
+            </a:schemeClr>
+          </a:lnRef>
+          <a:fillRef idx="1">
+            <a:schemeClr val="accent1"/>
+          </a:fillRef>
+          <a:effectRef idx="0">
+            <a:schemeClr val="accent1"/>
+          </a:effectRef>
+          <a:fontRef idx="minor">
+            <a:schemeClr val="lt1"/>
+          </a:fontRef>
+        </p:style>
+        <p:txBody>
+          <a:bodyPr rtlCol="0" anchor="ctr"/>
+          <a:lstStyle/>
+          <a:p>
+            <a:pPr algn="ctr"/>
+            <a:endParaRPr lang="nl-NL"/>
+          </a:p>
+        </p:txBody>
+      </p:sp>
+      <p:sp>
+        <p:nvSpPr>
+          <p:cNvPr id="24" name="Rounded Rectangle 23"/>
+          <p:cNvSpPr/>
+          <p:nvPr/>
+        </p:nvSpPr>
+        <p:spPr>
+          <a:xfrm>
+            <a:off x="5182576" y="1901383"/>
+            <a:ext cx="1534314" cy="2648039"/>
+          </a:xfrm>
+          <a:prstGeom prst="roundRect">
+            <a:avLst/>
+          </a:prstGeom>
+          <a:solidFill>
+            <a:schemeClr val="bg1">
+              <a:alpha val="0"/>
+            </a:schemeClr>
+          </a:solidFill>
+          <a:ln>
+            <a:prstDash val="dash"/>
+          </a:ln>
+        </p:spPr>
+        <p:style>
+          <a:lnRef idx="2">
+            <a:schemeClr val="accent1">
+              <a:shade val="50000"/>
+            </a:schemeClr>
+          </a:lnRef>
+          <a:fillRef idx="1">
+            <a:schemeClr val="accent1"/>
+          </a:fillRef>
+          <a:effectRef idx="0">
+            <a:schemeClr val="accent1"/>
+          </a:effectRef>
+          <a:fontRef idx="minor">
+            <a:schemeClr val="lt1"/>
+          </a:fontRef>
+        </p:style>
+        <p:txBody>
+          <a:bodyPr rtlCol="0" anchor="ctr"/>
+          <a:lstStyle/>
+          <a:p>
+            <a:pPr algn="ctr"/>
+            <a:endParaRPr lang="nl-NL"/>
+          </a:p>
+        </p:txBody>
+      </p:sp>
+      <p:sp>
+        <p:nvSpPr>
+          <p:cNvPr id="25" name="TextBox 24"/>
+          <p:cNvSpPr txBox="1"/>
+          <p:nvPr/>
+        </p:nvSpPr>
+        <p:spPr>
+          <a:xfrm>
+            <a:off x="5707442" y="1497330"/>
+            <a:ext cx="453970" cy="400110"/>
+          </a:xfrm>
+          <a:prstGeom prst="rect">
+            <a:avLst/>
+          </a:prstGeom>
+          <a:noFill/>
+        </p:spPr>
+        <p:txBody>
+          <a:bodyPr wrap="none" rtlCol="0">
+            <a:spAutoFit/>
+          </a:bodyPr>
+          <a:lstStyle/>
+          <a:p>
+            <a:r>
+              <a:rPr lang="en-US" sz="2000" dirty="0"/>
+              <a:t>PC</a:t>
+            </a:r>
+            <a:endParaRPr lang="nl-NL" sz="2000" dirty="0"/>
+          </a:p>
+        </p:txBody>
+      </p:sp>
+      <p:sp>
+        <p:nvSpPr>
+          <p:cNvPr id="26" name="TextBox 25"/>
+          <p:cNvSpPr txBox="1"/>
+          <p:nvPr/>
+        </p:nvSpPr>
+        <p:spPr>
+          <a:xfrm>
+            <a:off x="2523283" y="2045074"/>
+            <a:ext cx="676900" cy="400110"/>
+          </a:xfrm>
+          <a:prstGeom prst="rect">
+            <a:avLst/>
+          </a:prstGeom>
+          <a:noFill/>
+        </p:spPr>
+        <p:txBody>
+          <a:bodyPr wrap="square" rtlCol="0">
+            <a:spAutoFit/>
+          </a:bodyPr>
+          <a:lstStyle/>
+          <a:p>
+            <a:r>
+              <a:rPr lang="en-US" sz="2000" dirty="0" err="1"/>
+              <a:t>Zalt</a:t>
+            </a:r>
+            <a:endParaRPr lang="nl-NL" sz="2000" dirty="0"/>
+          </a:p>
+        </p:txBody>
+      </p:sp>
+      <p:sp>
+        <p:nvSpPr>
+          <p:cNvPr id="27" name="TextBox 26"/>
+          <p:cNvSpPr txBox="1"/>
+          <p:nvPr/>
+        </p:nvSpPr>
+        <p:spPr>
+          <a:xfrm>
+            <a:off x="4483046" y="1946041"/>
+            <a:ext cx="607859" cy="400110"/>
+          </a:xfrm>
+          <a:prstGeom prst="rect">
+            <a:avLst/>
+          </a:prstGeom>
+          <a:noFill/>
+        </p:spPr>
+        <p:txBody>
+          <a:bodyPr wrap="none" rtlCol="0">
+            <a:spAutoFit/>
+          </a:bodyPr>
+          <a:lstStyle/>
+          <a:p>
+            <a:r>
+              <a:rPr lang="en-US" sz="2000" dirty="0"/>
+              <a:t>USB</a:t>
+            </a:r>
+            <a:endParaRPr lang="nl-NL" sz="2000" dirty="0"/>
+          </a:p>
+        </p:txBody>
+      </p:sp>
+      <p:sp>
+        <p:nvSpPr>
+          <p:cNvPr id="28" name="TextBox 27"/>
+          <p:cNvSpPr txBox="1"/>
+          <p:nvPr/>
+        </p:nvSpPr>
+        <p:spPr>
+          <a:xfrm>
+            <a:off x="2523283" y="3331845"/>
+            <a:ext cx="676900" cy="261610"/>
+          </a:xfrm>
+          <a:prstGeom prst="rect">
+            <a:avLst/>
+          </a:prstGeom>
+          <a:noFill/>
+        </p:spPr>
+        <p:txBody>
+          <a:bodyPr wrap="square" rtlCol="0">
+            <a:spAutoFit/>
+          </a:bodyPr>
+          <a:lstStyle/>
+          <a:p>
+            <a:r>
+              <a:rPr lang="en-US" sz="1100" dirty="0" err="1"/>
+              <a:t>Int</a:t>
+            </a:r>
+            <a:r>
+              <a:rPr lang="en-US" sz="1100" dirty="0"/>
+              <a:t> / IO</a:t>
+            </a:r>
+            <a:endParaRPr lang="nl-NL" sz="1100" dirty="0"/>
+          </a:p>
+        </p:txBody>
+      </p:sp>
+    </p:spTree>
+    <p:extLst>
+      <p:ext uri="{BB962C8B-B14F-4D97-AF65-F5344CB8AC3E}">
+        <p14:creationId xmlns:p14="http://schemas.microsoft.com/office/powerpoint/2010/main" val="639099771"/>
       </p:ext>
     </p:extLst>
   </p:cSld>

</xml_diff>

<commit_message>
restoring old character port
</commit_message>
<xml_diff>
--- a/Design/Diagrams.pptx
+++ b/Design/Diagrams.pptx
@@ -8,6 +8,7 @@
     <p:sldId id="256" r:id="rId2"/>
     <p:sldId id="257" r:id="rId3"/>
     <p:sldId id="258" r:id="rId4"/>
+    <p:sldId id="259" r:id="rId5"/>
   </p:sldIdLst>
   <p:sldSz cx="12192000" cy="6858000"/>
   <p:notesSz cx="6858000" cy="9144000"/>
@@ -245,7 +246,7 @@
           <a:p>
             <a:fld id="{1C607521-F3C3-4241-B9F9-5903AE8EACB6}" type="datetimeFigureOut">
               <a:rPr lang="nl-NL" smtClean="0"/>
-              <a:t>25-1-2017</a:t>
+              <a:t>21-12-2018</a:t>
             </a:fld>
             <a:endParaRPr lang="nl-NL"/>
           </a:p>
@@ -415,7 +416,7 @@
           <a:p>
             <a:fld id="{1C607521-F3C3-4241-B9F9-5903AE8EACB6}" type="datetimeFigureOut">
               <a:rPr lang="nl-NL" smtClean="0"/>
-              <a:t>25-1-2017</a:t>
+              <a:t>21-12-2018</a:t>
             </a:fld>
             <a:endParaRPr lang="nl-NL"/>
           </a:p>
@@ -595,7 +596,7 @@
           <a:p>
             <a:fld id="{1C607521-F3C3-4241-B9F9-5903AE8EACB6}" type="datetimeFigureOut">
               <a:rPr lang="nl-NL" smtClean="0"/>
-              <a:t>25-1-2017</a:t>
+              <a:t>21-12-2018</a:t>
             </a:fld>
             <a:endParaRPr lang="nl-NL"/>
           </a:p>
@@ -765,7 +766,7 @@
           <a:p>
             <a:fld id="{1C607521-F3C3-4241-B9F9-5903AE8EACB6}" type="datetimeFigureOut">
               <a:rPr lang="nl-NL" smtClean="0"/>
-              <a:t>25-1-2017</a:t>
+              <a:t>21-12-2018</a:t>
             </a:fld>
             <a:endParaRPr lang="nl-NL"/>
           </a:p>
@@ -1011,7 +1012,7 @@
           <a:p>
             <a:fld id="{1C607521-F3C3-4241-B9F9-5903AE8EACB6}" type="datetimeFigureOut">
               <a:rPr lang="nl-NL" smtClean="0"/>
-              <a:t>25-1-2017</a:t>
+              <a:t>21-12-2018</a:t>
             </a:fld>
             <a:endParaRPr lang="nl-NL"/>
           </a:p>
@@ -1243,7 +1244,7 @@
           <a:p>
             <a:fld id="{1C607521-F3C3-4241-B9F9-5903AE8EACB6}" type="datetimeFigureOut">
               <a:rPr lang="nl-NL" smtClean="0"/>
-              <a:t>25-1-2017</a:t>
+              <a:t>21-12-2018</a:t>
             </a:fld>
             <a:endParaRPr lang="nl-NL"/>
           </a:p>
@@ -1610,7 +1611,7 @@
           <a:p>
             <a:fld id="{1C607521-F3C3-4241-B9F9-5903AE8EACB6}" type="datetimeFigureOut">
               <a:rPr lang="nl-NL" smtClean="0"/>
-              <a:t>25-1-2017</a:t>
+              <a:t>21-12-2018</a:t>
             </a:fld>
             <a:endParaRPr lang="nl-NL"/>
           </a:p>
@@ -1728,7 +1729,7 @@
           <a:p>
             <a:fld id="{1C607521-F3C3-4241-B9F9-5903AE8EACB6}" type="datetimeFigureOut">
               <a:rPr lang="nl-NL" smtClean="0"/>
-              <a:t>25-1-2017</a:t>
+              <a:t>21-12-2018</a:t>
             </a:fld>
             <a:endParaRPr lang="nl-NL"/>
           </a:p>
@@ -1823,7 +1824,7 @@
           <a:p>
             <a:fld id="{1C607521-F3C3-4241-B9F9-5903AE8EACB6}" type="datetimeFigureOut">
               <a:rPr lang="nl-NL" smtClean="0"/>
-              <a:t>25-1-2017</a:t>
+              <a:t>21-12-2018</a:t>
             </a:fld>
             <a:endParaRPr lang="nl-NL"/>
           </a:p>
@@ -2100,7 +2101,7 @@
           <a:p>
             <a:fld id="{1C607521-F3C3-4241-B9F9-5903AE8EACB6}" type="datetimeFigureOut">
               <a:rPr lang="nl-NL" smtClean="0"/>
-              <a:t>25-1-2017</a:t>
+              <a:t>21-12-2018</a:t>
             </a:fld>
             <a:endParaRPr lang="nl-NL"/>
           </a:p>
@@ -2353,7 +2354,7 @@
           <a:p>
             <a:fld id="{1C607521-F3C3-4241-B9F9-5903AE8EACB6}" type="datetimeFigureOut">
               <a:rPr lang="nl-NL" smtClean="0"/>
-              <a:t>25-1-2017</a:t>
+              <a:t>21-12-2018</a:t>
             </a:fld>
             <a:endParaRPr lang="nl-NL"/>
           </a:p>
@@ -2566,7 +2567,7 @@
           <a:p>
             <a:fld id="{1C607521-F3C3-4241-B9F9-5903AE8EACB6}" type="datetimeFigureOut">
               <a:rPr lang="nl-NL" smtClean="0"/>
-              <a:t>25-1-2017</a:t>
+              <a:t>21-12-2018</a:t>
             </a:fld>
             <a:endParaRPr lang="nl-NL"/>
           </a:p>
@@ -5711,6 +5712,86 @@
 </p:sld>
 </file>
 
+<file path=ppt/slides/slide4.xml><?xml version="1.0" encoding="utf-8"?>
+<p:sld xmlns:a="http://schemas.openxmlformats.org/drawingml/2006/main" xmlns:r="http://schemas.openxmlformats.org/officeDocument/2006/relationships" xmlns:p="http://schemas.openxmlformats.org/presentationml/2006/main">
+  <p:cSld>
+    <p:spTree>
+      <p:nvGrpSpPr>
+        <p:cNvPr id="1" name=""/>
+        <p:cNvGrpSpPr/>
+        <p:nvPr/>
+      </p:nvGrpSpPr>
+      <p:grpSpPr>
+        <a:xfrm>
+          <a:off x="0" y="0"/>
+          <a:ext cx="0" cy="0"/>
+          <a:chOff x="0" y="0"/>
+          <a:chExt cx="0" cy="0"/>
+        </a:xfrm>
+      </p:grpSpPr>
+      <p:sp>
+        <p:nvSpPr>
+          <p:cNvPr id="2" name="Title 1">
+            <a:extLst>
+              <a:ext uri="{FF2B5EF4-FFF2-40B4-BE49-F238E27FC236}">
+                <a16:creationId xmlns:a16="http://schemas.microsoft.com/office/drawing/2014/main" id="{A0824750-5A66-44C3-93C6-8D4127FD0659}"/>
+              </a:ext>
+            </a:extLst>
+          </p:cNvPr>
+          <p:cNvSpPr>
+            <a:spLocks noGrp="1"/>
+          </p:cNvSpPr>
+          <p:nvPr>
+            <p:ph type="title"/>
+          </p:nvPr>
+        </p:nvSpPr>
+        <p:spPr/>
+        <p:txBody>
+          <a:bodyPr/>
+          <a:lstStyle/>
+          <a:p>
+            <a:endParaRPr lang="en-US"/>
+          </a:p>
+        </p:txBody>
+      </p:sp>
+      <p:sp>
+        <p:nvSpPr>
+          <p:cNvPr id="3" name="Content Placeholder 2">
+            <a:extLst>
+              <a:ext uri="{FF2B5EF4-FFF2-40B4-BE49-F238E27FC236}">
+                <a16:creationId xmlns:a16="http://schemas.microsoft.com/office/drawing/2014/main" id="{9D956B88-D888-457A-83F8-BAE729014701}"/>
+              </a:ext>
+            </a:extLst>
+          </p:cNvPr>
+          <p:cNvSpPr>
+            <a:spLocks noGrp="1"/>
+          </p:cNvSpPr>
+          <p:nvPr>
+            <p:ph idx="1"/>
+          </p:nvPr>
+        </p:nvSpPr>
+        <p:spPr/>
+        <p:txBody>
+          <a:bodyPr/>
+          <a:lstStyle/>
+          <a:p>
+            <a:endParaRPr lang="en-US"/>
+          </a:p>
+        </p:txBody>
+      </p:sp>
+    </p:spTree>
+    <p:extLst>
+      <p:ext uri="{BB962C8B-B14F-4D97-AF65-F5344CB8AC3E}">
+        <p14:creationId xmlns:p14="http://schemas.microsoft.com/office/powerpoint/2010/main" val="1497889873"/>
+      </p:ext>
+    </p:extLst>
+  </p:cSld>
+  <p:clrMapOvr>
+    <a:masterClrMapping/>
+  </p:clrMapOvr>
+</p:sld>
+</file>
+
 <file path=ppt/theme/theme1.xml><?xml version="1.0" encoding="utf-8"?>
 <a:theme xmlns:a="http://schemas.openxmlformats.org/drawingml/2006/main" name="Office Theme">
   <a:themeElements>

</xml_diff>